<commit_message>
df added to 1 weakness
</commit_message>
<xml_diff>
--- a/Presentations/Presentation8.pptx
+++ b/Presentations/Presentation8.pptx
@@ -10,7 +10,8 @@
     <p:sldId id="265" r:id="rId4"/>
     <p:sldId id="266" r:id="rId5"/>
     <p:sldId id="267" r:id="rId6"/>
-    <p:sldId id="262" r:id="rId7"/>
+    <p:sldId id="268" r:id="rId7"/>
+    <p:sldId id="262" r:id="rId8"/>
   </p:sldIdLst>
   <p:sldSz cx="12192000" cy="6858000"/>
   <p:notesSz cx="6858000" cy="9144000"/>
@@ -3940,7 +3941,7 @@
             <p:ph idx="1"/>
             <p:extLst>
               <p:ext uri="{D42A27DB-BD31-4B8C-83A1-F6EECF244321}">
-                <p14:modId xmlns:p14="http://schemas.microsoft.com/office/powerpoint/2010/main" val="4236824888"/>
+                <p14:modId xmlns:p14="http://schemas.microsoft.com/office/powerpoint/2010/main" val="3897784595"/>
               </p:ext>
             </p:extLst>
           </p:nvPr>
@@ -4705,7 +4706,7 @@
                       <a:r>
                         <a:rPr lang="en-US" sz="1400" dirty="0">
                           <a:solidFill>
-                            <a:schemeClr val="accent6"/>
+                            <a:srgbClr val="00B050"/>
                           </a:solidFill>
                         </a:rPr>
                         <a:t>Currently only neighboring tasks are considered. (Case/trace level)</a:t>
@@ -4777,7 +4778,7 @@
           <a:p>
             <a:pPr algn="ctr"/>
             <a:r>
-              <a:rPr lang="en-US" dirty="0"/>
+              <a:rPr lang="en-US" b="1" dirty="0"/>
               <a:t>Framework around weakness</a:t>
             </a:r>
           </a:p>
@@ -5579,6 +5580,14 @@
 <file path=ppt/slides/slide4.xml><?xml version="1.0" encoding="utf-8"?>
 <p:sld xmlns:a="http://schemas.openxmlformats.org/drawingml/2006/main" xmlns:r="http://schemas.openxmlformats.org/officeDocument/2006/relationships" xmlns:p="http://schemas.openxmlformats.org/presentationml/2006/main">
   <p:cSld>
+    <p:bg>
+      <p:bgPr>
+        <a:solidFill>
+          <a:schemeClr val="bg1"/>
+        </a:solidFill>
+        <a:effectLst/>
+      </p:bgPr>
+    </p:bg>
     <p:spTree>
       <p:nvGrpSpPr>
         <p:cNvPr id="1" name=""/>
@@ -5593,6 +5602,528 @@
           <a:chExt cx="0" cy="0"/>
         </a:xfrm>
       </p:grpSpPr>
+      <p:sp useBgFill="1">
+        <p:nvSpPr>
+          <p:cNvPr id="8" name="Rectangle 7">
+            <a:extLst>
+              <a:ext uri="{FF2B5EF4-FFF2-40B4-BE49-F238E27FC236}">
+                <a16:creationId xmlns:a16="http://schemas.microsoft.com/office/drawing/2014/main" id="{827B839B-9ADE-406B-8590-F1CAEDED45A1}"/>
+              </a:ext>
+              <a:ext uri="{C183D7F6-B498-43B3-948B-1728B52AA6E4}">
+                <adec:decorative xmlns:adec="http://schemas.microsoft.com/office/drawing/2017/decorative" val="1"/>
+              </a:ext>
+            </a:extLst>
+          </p:cNvPr>
+          <p:cNvSpPr>
+            <a:spLocks noGrp="1" noRot="1" noChangeAspect="1" noMove="1" noResize="1" noEditPoints="1" noAdjustHandles="1" noChangeArrowheads="1" noChangeShapeType="1" noTextEdit="1"/>
+          </p:cNvSpPr>
+          <p:nvPr>
+            <p:extLst>
+              <p:ext uri="{386F3935-93C4-4BCD-93E2-E3B085C9AB24}">
+                <p16:designElem xmlns:p16="http://schemas.microsoft.com/office/powerpoint/2015/main" val="1"/>
+              </p:ext>
+            </p:extLst>
+          </p:nvPr>
+        </p:nvSpPr>
+        <p:spPr>
+          <a:xfrm>
+            <a:off x="0" y="0"/>
+            <a:ext cx="12188952" cy="6858000"/>
+          </a:xfrm>
+          <a:prstGeom prst="rect">
+            <a:avLst/>
+          </a:prstGeom>
+          <a:ln>
+            <a:noFill/>
+          </a:ln>
+        </p:spPr>
+        <p:style>
+          <a:lnRef idx="2">
+            <a:schemeClr val="accent1">
+              <a:shade val="50000"/>
+            </a:schemeClr>
+          </a:lnRef>
+          <a:fillRef idx="1">
+            <a:schemeClr val="accent1"/>
+          </a:fillRef>
+          <a:effectRef idx="0">
+            <a:schemeClr val="accent1"/>
+          </a:effectRef>
+          <a:fontRef idx="minor">
+            <a:schemeClr val="lt1"/>
+          </a:fontRef>
+        </p:style>
+        <p:txBody>
+          <a:bodyPr rtlCol="0" anchor="ctr"/>
+          <a:lstStyle/>
+          <a:p>
+            <a:pPr algn="ctr"/>
+            <a:endParaRPr lang="en-US"/>
+          </a:p>
+        </p:txBody>
+      </p:sp>
+      <p:sp>
+        <p:nvSpPr>
+          <p:cNvPr id="10" name="Freeform 45">
+            <a:extLst>
+              <a:ext uri="{FF2B5EF4-FFF2-40B4-BE49-F238E27FC236}">
+                <a16:creationId xmlns:a16="http://schemas.microsoft.com/office/drawing/2014/main" id="{CFE45BF0-46DB-408C-B5F7-7B11716805D4}"/>
+              </a:ext>
+              <a:ext uri="{C183D7F6-B498-43B3-948B-1728B52AA6E4}">
+                <adec:decorative xmlns:adec="http://schemas.microsoft.com/office/drawing/2017/decorative" val="1"/>
+              </a:ext>
+            </a:extLst>
+          </p:cNvPr>
+          <p:cNvSpPr>
+            <a:spLocks noGrp="1" noRot="1" noChangeAspect="1" noMove="1" noResize="1" noEditPoints="1" noAdjustHandles="1" noChangeArrowheads="1" noChangeShapeType="1" noTextEdit="1"/>
+          </p:cNvSpPr>
+          <p:nvPr>
+            <p:extLst>
+              <p:ext uri="{386F3935-93C4-4BCD-93E2-E3B085C9AB24}">
+                <p16:designElem xmlns:p16="http://schemas.microsoft.com/office/powerpoint/2015/main" val="1"/>
+              </p:ext>
+            </p:extLst>
+          </p:nvPr>
+        </p:nvSpPr>
+        <p:spPr bwMode="auto">
+          <a:xfrm>
+            <a:off x="409710" y="1022350"/>
+            <a:ext cx="709612" cy="2095501"/>
+          </a:xfrm>
+          <a:custGeom>
+            <a:avLst/>
+            <a:gdLst>
+              <a:gd name="T0" fmla="*/ 447 w 447"/>
+              <a:gd name="T1" fmla="*/ 1363 h 1363"/>
+              <a:gd name="T2" fmla="*/ 0 w 447"/>
+              <a:gd name="T3" fmla="*/ 987 h 1363"/>
+              <a:gd name="T4" fmla="*/ 0 w 447"/>
+              <a:gd name="T5" fmla="*/ 0 h 1363"/>
+              <a:gd name="T6" fmla="*/ 447 w 447"/>
+              <a:gd name="T7" fmla="*/ 376 h 1363"/>
+              <a:gd name="T8" fmla="*/ 447 w 447"/>
+              <a:gd name="T9" fmla="*/ 1363 h 1363"/>
+            </a:gdLst>
+            <a:ahLst/>
+            <a:cxnLst>
+              <a:cxn ang="0">
+                <a:pos x="T0" y="T1"/>
+              </a:cxn>
+              <a:cxn ang="0">
+                <a:pos x="T2" y="T3"/>
+              </a:cxn>
+              <a:cxn ang="0">
+                <a:pos x="T4" y="T5"/>
+              </a:cxn>
+              <a:cxn ang="0">
+                <a:pos x="T6" y="T7"/>
+              </a:cxn>
+              <a:cxn ang="0">
+                <a:pos x="T8" y="T9"/>
+              </a:cxn>
+            </a:cxnLst>
+            <a:rect l="0" t="0" r="r" b="b"/>
+            <a:pathLst>
+              <a:path w="447" h="1363">
+                <a:moveTo>
+                  <a:pt x="447" y="1363"/>
+                </a:moveTo>
+                <a:lnTo>
+                  <a:pt x="0" y="987"/>
+                </a:lnTo>
+                <a:lnTo>
+                  <a:pt x="0" y="0"/>
+                </a:lnTo>
+                <a:lnTo>
+                  <a:pt x="447" y="376"/>
+                </a:lnTo>
+                <a:lnTo>
+                  <a:pt x="447" y="1363"/>
+                </a:lnTo>
+                <a:close/>
+              </a:path>
+            </a:pathLst>
+          </a:custGeom>
+          <a:solidFill>
+            <a:schemeClr val="accent1">
+              <a:lumMod val="50000"/>
+            </a:schemeClr>
+          </a:solidFill>
+          <a:ln>
+            <a:noFill/>
+          </a:ln>
+        </p:spPr>
+        <p:txBody>
+          <a:bodyPr vert="horz" wrap="square" lIns="91440" tIns="45720" rIns="91440" bIns="45720" numCol="1" anchor="t" anchorCtr="0" compatLnSpc="1">
+            <a:prstTxWarp prst="textNoShape">
+              <a:avLst/>
+            </a:prstTxWarp>
+          </a:bodyPr>
+          <a:lstStyle/>
+          <a:p>
+            <a:endParaRPr lang="en-US"/>
+          </a:p>
+        </p:txBody>
+      </p:sp>
+      <p:sp>
+        <p:nvSpPr>
+          <p:cNvPr id="12" name="Freeform 46">
+            <a:extLst>
+              <a:ext uri="{FF2B5EF4-FFF2-40B4-BE49-F238E27FC236}">
+                <a16:creationId xmlns:a16="http://schemas.microsoft.com/office/drawing/2014/main" id="{2AEBC8F2-97B1-41B4-93F1-2D289E197FBA}"/>
+              </a:ext>
+              <a:ext uri="{C183D7F6-B498-43B3-948B-1728B52AA6E4}">
+                <adec:decorative xmlns:adec="http://schemas.microsoft.com/office/drawing/2017/decorative" val="1"/>
+              </a:ext>
+            </a:extLst>
+          </p:cNvPr>
+          <p:cNvSpPr>
+            <a:spLocks noGrp="1" noRot="1" noChangeAspect="1" noMove="1" noResize="1" noEditPoints="1" noAdjustHandles="1" noChangeArrowheads="1" noChangeShapeType="1" noTextEdit="1"/>
+          </p:cNvSpPr>
+          <p:nvPr>
+            <p:extLst>
+              <p:ext uri="{386F3935-93C4-4BCD-93E2-E3B085C9AB24}">
+                <p16:designElem xmlns:p16="http://schemas.microsoft.com/office/powerpoint/2015/main" val="1"/>
+              </p:ext>
+            </p:extLst>
+          </p:nvPr>
+        </p:nvSpPr>
+        <p:spPr bwMode="auto">
+          <a:xfrm>
+            <a:off x="409710" y="837744"/>
+            <a:ext cx="403225" cy="1705431"/>
+          </a:xfrm>
+          <a:custGeom>
+            <a:avLst/>
+            <a:gdLst>
+              <a:gd name="T0" fmla="*/ 254 w 254"/>
+              <a:gd name="T1" fmla="*/ 987 h 1109"/>
+              <a:gd name="T2" fmla="*/ 0 w 254"/>
+              <a:gd name="T3" fmla="*/ 1109 h 1109"/>
+              <a:gd name="T4" fmla="*/ 0 w 254"/>
+              <a:gd name="T5" fmla="*/ 119 h 1109"/>
+              <a:gd name="T6" fmla="*/ 254 w 254"/>
+              <a:gd name="T7" fmla="*/ 0 h 1109"/>
+              <a:gd name="T8" fmla="*/ 254 w 254"/>
+              <a:gd name="T9" fmla="*/ 987 h 1109"/>
+            </a:gdLst>
+            <a:ahLst/>
+            <a:cxnLst>
+              <a:cxn ang="0">
+                <a:pos x="T0" y="T1"/>
+              </a:cxn>
+              <a:cxn ang="0">
+                <a:pos x="T2" y="T3"/>
+              </a:cxn>
+              <a:cxn ang="0">
+                <a:pos x="T4" y="T5"/>
+              </a:cxn>
+              <a:cxn ang="0">
+                <a:pos x="T6" y="T7"/>
+              </a:cxn>
+              <a:cxn ang="0">
+                <a:pos x="T8" y="T9"/>
+              </a:cxn>
+            </a:cxnLst>
+            <a:rect l="0" t="0" r="r" b="b"/>
+            <a:pathLst>
+              <a:path w="254" h="1109">
+                <a:moveTo>
+                  <a:pt x="254" y="987"/>
+                </a:moveTo>
+                <a:lnTo>
+                  <a:pt x="0" y="1109"/>
+                </a:lnTo>
+                <a:lnTo>
+                  <a:pt x="0" y="119"/>
+                </a:lnTo>
+                <a:lnTo>
+                  <a:pt x="254" y="0"/>
+                </a:lnTo>
+                <a:lnTo>
+                  <a:pt x="254" y="987"/>
+                </a:lnTo>
+                <a:close/>
+              </a:path>
+            </a:pathLst>
+          </a:custGeom>
+          <a:solidFill>
+            <a:schemeClr val="accent1">
+              <a:lumMod val="75000"/>
+            </a:schemeClr>
+          </a:solidFill>
+          <a:ln>
+            <a:noFill/>
+          </a:ln>
+        </p:spPr>
+        <p:txBody>
+          <a:bodyPr vert="horz" wrap="square" lIns="91440" tIns="45720" rIns="91440" bIns="45720" numCol="1" anchor="t" anchorCtr="0" compatLnSpc="1">
+            <a:prstTxWarp prst="textNoShape">
+              <a:avLst/>
+            </a:prstTxWarp>
+          </a:bodyPr>
+          <a:lstStyle/>
+          <a:p>
+            <a:endParaRPr lang="en-US"/>
+          </a:p>
+        </p:txBody>
+      </p:sp>
+      <p:sp>
+        <p:nvSpPr>
+          <p:cNvPr id="14" name="Freeform 47">
+            <a:extLst>
+              <a:ext uri="{FF2B5EF4-FFF2-40B4-BE49-F238E27FC236}">
+                <a16:creationId xmlns:a16="http://schemas.microsoft.com/office/drawing/2014/main" id="{472E3A19-F5D5-48FC-BB9C-48C2F68F598B}"/>
+              </a:ext>
+              <a:ext uri="{C183D7F6-B498-43B3-948B-1728B52AA6E4}">
+                <adec:decorative xmlns:adec="http://schemas.microsoft.com/office/drawing/2017/decorative" val="1"/>
+              </a:ext>
+            </a:extLst>
+          </p:cNvPr>
+          <p:cNvSpPr>
+            <a:spLocks noGrp="1" noRot="1" noChangeAspect="1" noMove="1" noResize="1" noEditPoints="1" noAdjustHandles="1" noChangeArrowheads="1" noChangeShapeType="1" noTextEdit="1"/>
+          </p:cNvSpPr>
+          <p:nvPr>
+            <p:extLst>
+              <p:ext uri="{386F3935-93C4-4BCD-93E2-E3B085C9AB24}">
+                <p16:designElem xmlns:p16="http://schemas.microsoft.com/office/powerpoint/2015/main" val="1"/>
+              </p:ext>
+            </p:extLst>
+          </p:nvPr>
+        </p:nvSpPr>
+        <p:spPr bwMode="auto">
+          <a:xfrm>
+            <a:off x="644660" y="640894"/>
+            <a:ext cx="168275" cy="1713195"/>
+          </a:xfrm>
+          <a:custGeom>
+            <a:avLst/>
+            <a:gdLst>
+              <a:gd name="T0" fmla="*/ 106 w 106"/>
+              <a:gd name="T1" fmla="*/ 1114 h 1114"/>
+              <a:gd name="T2" fmla="*/ 0 w 106"/>
+              <a:gd name="T3" fmla="*/ 1005 h 1114"/>
+              <a:gd name="T4" fmla="*/ 0 w 106"/>
+              <a:gd name="T5" fmla="*/ 0 h 1114"/>
+              <a:gd name="T6" fmla="*/ 106 w 106"/>
+              <a:gd name="T7" fmla="*/ 110 h 1114"/>
+              <a:gd name="T8" fmla="*/ 106 w 106"/>
+              <a:gd name="T9" fmla="*/ 1114 h 1114"/>
+            </a:gdLst>
+            <a:ahLst/>
+            <a:cxnLst>
+              <a:cxn ang="0">
+                <a:pos x="T0" y="T1"/>
+              </a:cxn>
+              <a:cxn ang="0">
+                <a:pos x="T2" y="T3"/>
+              </a:cxn>
+              <a:cxn ang="0">
+                <a:pos x="T4" y="T5"/>
+              </a:cxn>
+              <a:cxn ang="0">
+                <a:pos x="T6" y="T7"/>
+              </a:cxn>
+              <a:cxn ang="0">
+                <a:pos x="T8" y="T9"/>
+              </a:cxn>
+            </a:cxnLst>
+            <a:rect l="0" t="0" r="r" b="b"/>
+            <a:pathLst>
+              <a:path w="106" h="1114">
+                <a:moveTo>
+                  <a:pt x="106" y="1114"/>
+                </a:moveTo>
+                <a:lnTo>
+                  <a:pt x="0" y="1005"/>
+                </a:lnTo>
+                <a:lnTo>
+                  <a:pt x="0" y="0"/>
+                </a:lnTo>
+                <a:lnTo>
+                  <a:pt x="106" y="110"/>
+                </a:lnTo>
+                <a:lnTo>
+                  <a:pt x="106" y="1114"/>
+                </a:lnTo>
+                <a:close/>
+              </a:path>
+            </a:pathLst>
+          </a:custGeom>
+          <a:solidFill>
+            <a:schemeClr val="accent1">
+              <a:lumMod val="50000"/>
+            </a:schemeClr>
+          </a:solidFill>
+          <a:ln>
+            <a:noFill/>
+          </a:ln>
+        </p:spPr>
+        <p:txBody>
+          <a:bodyPr vert="horz" wrap="square" lIns="91440" tIns="45720" rIns="91440" bIns="45720" numCol="1" anchor="t" anchorCtr="0" compatLnSpc="1">
+            <a:prstTxWarp prst="textNoShape">
+              <a:avLst/>
+            </a:prstTxWarp>
+          </a:bodyPr>
+          <a:lstStyle/>
+          <a:p>
+            <a:endParaRPr lang="en-US"/>
+          </a:p>
+        </p:txBody>
+      </p:sp>
+      <p:sp>
+        <p:nvSpPr>
+          <p:cNvPr id="16" name="Freeform 44">
+            <a:extLst>
+              <a:ext uri="{FF2B5EF4-FFF2-40B4-BE49-F238E27FC236}">
+                <a16:creationId xmlns:a16="http://schemas.microsoft.com/office/drawing/2014/main" id="{7A62E32F-BB65-43A8-8EB5-92346890E549}"/>
+              </a:ext>
+              <a:ext uri="{C183D7F6-B498-43B3-948B-1728B52AA6E4}">
+                <adec:decorative xmlns:adec="http://schemas.microsoft.com/office/drawing/2017/decorative" val="1"/>
+              </a:ext>
+            </a:extLst>
+          </p:cNvPr>
+          <p:cNvSpPr>
+            <a:spLocks noGrp="1" noRot="1" noChangeAspect="1" noMove="1" noResize="1" noEditPoints="1" noAdjustHandles="1" noChangeArrowheads="1" noChangeShapeType="1" noTextEdit="1"/>
+          </p:cNvSpPr>
+          <p:nvPr>
+            <p:extLst>
+              <p:ext uri="{386F3935-93C4-4BCD-93E2-E3B085C9AB24}">
+                <p16:designElem xmlns:p16="http://schemas.microsoft.com/office/powerpoint/2015/main" val="1"/>
+              </p:ext>
+            </p:extLst>
+          </p:nvPr>
+        </p:nvSpPr>
+        <p:spPr bwMode="auto">
+          <a:xfrm>
+            <a:off x="11223203" y="635716"/>
+            <a:ext cx="328612" cy="1742360"/>
+          </a:xfrm>
+          <a:custGeom>
+            <a:avLst/>
+            <a:gdLst>
+              <a:gd name="T0" fmla="*/ 207 w 207"/>
+              <a:gd name="T1" fmla="*/ 987 h 1114"/>
+              <a:gd name="T2" fmla="*/ 0 w 207"/>
+              <a:gd name="T3" fmla="*/ 1114 h 1114"/>
+              <a:gd name="T4" fmla="*/ 0 w 207"/>
+              <a:gd name="T5" fmla="*/ 127 h 1114"/>
+              <a:gd name="T6" fmla="*/ 207 w 207"/>
+              <a:gd name="T7" fmla="*/ 0 h 1114"/>
+              <a:gd name="T8" fmla="*/ 207 w 207"/>
+              <a:gd name="T9" fmla="*/ 987 h 1114"/>
+            </a:gdLst>
+            <a:ahLst/>
+            <a:cxnLst>
+              <a:cxn ang="0">
+                <a:pos x="T0" y="T1"/>
+              </a:cxn>
+              <a:cxn ang="0">
+                <a:pos x="T2" y="T3"/>
+              </a:cxn>
+              <a:cxn ang="0">
+                <a:pos x="T4" y="T5"/>
+              </a:cxn>
+              <a:cxn ang="0">
+                <a:pos x="T6" y="T7"/>
+              </a:cxn>
+              <a:cxn ang="0">
+                <a:pos x="T8" y="T9"/>
+              </a:cxn>
+            </a:cxnLst>
+            <a:rect l="0" t="0" r="r" b="b"/>
+            <a:pathLst>
+              <a:path w="207" h="1114">
+                <a:moveTo>
+                  <a:pt x="207" y="987"/>
+                </a:moveTo>
+                <a:lnTo>
+                  <a:pt x="0" y="1114"/>
+                </a:lnTo>
+                <a:lnTo>
+                  <a:pt x="0" y="127"/>
+                </a:lnTo>
+                <a:lnTo>
+                  <a:pt x="207" y="0"/>
+                </a:lnTo>
+                <a:lnTo>
+                  <a:pt x="207" y="987"/>
+                </a:lnTo>
+                <a:close/>
+              </a:path>
+            </a:pathLst>
+          </a:custGeom>
+          <a:solidFill>
+            <a:schemeClr val="accent1">
+              <a:lumMod val="50000"/>
+            </a:schemeClr>
+          </a:solidFill>
+          <a:ln>
+            <a:noFill/>
+          </a:ln>
+        </p:spPr>
+        <p:txBody>
+          <a:bodyPr vert="horz" wrap="square" lIns="91440" tIns="45720" rIns="91440" bIns="45720" numCol="1" anchor="t" anchorCtr="0" compatLnSpc="1">
+            <a:prstTxWarp prst="textNoShape">
+              <a:avLst/>
+            </a:prstTxWarp>
+          </a:bodyPr>
+          <a:lstStyle/>
+          <a:p>
+            <a:endParaRPr lang="en-US"/>
+          </a:p>
+        </p:txBody>
+      </p:sp>
+      <p:sp>
+        <p:nvSpPr>
+          <p:cNvPr id="18" name="Rectangle 17">
+            <a:extLst>
+              <a:ext uri="{FF2B5EF4-FFF2-40B4-BE49-F238E27FC236}">
+                <a16:creationId xmlns:a16="http://schemas.microsoft.com/office/drawing/2014/main" id="{14E91B64-9FCC-451E-AFB4-A827D6329367}"/>
+              </a:ext>
+              <a:ext uri="{C183D7F6-B498-43B3-948B-1728B52AA6E4}">
+                <adec:decorative xmlns:adec="http://schemas.microsoft.com/office/drawing/2017/decorative" val="1"/>
+              </a:ext>
+            </a:extLst>
+          </p:cNvPr>
+          <p:cNvSpPr>
+            <a:spLocks noGrp="1" noRot="1" noChangeAspect="1" noMove="1" noResize="1" noEditPoints="1" noAdjustHandles="1" noChangeArrowheads="1" noChangeShapeType="1" noTextEdit="1"/>
+          </p:cNvSpPr>
+          <p:nvPr>
+            <p:extLst>
+              <p:ext uri="{386F3935-93C4-4BCD-93E2-E3B085C9AB24}">
+                <p16:designElem xmlns:p16="http://schemas.microsoft.com/office/powerpoint/2015/main" val="1"/>
+              </p:ext>
+            </p:extLst>
+          </p:nvPr>
+        </p:nvSpPr>
+        <p:spPr bwMode="auto">
+          <a:xfrm>
+            <a:off x="644055" y="635715"/>
+            <a:ext cx="10907863" cy="1541457"/>
+          </a:xfrm>
+          <a:prstGeom prst="rect">
+            <a:avLst/>
+          </a:prstGeom>
+          <a:solidFill>
+            <a:schemeClr val="accent1"/>
+          </a:solidFill>
+          <a:ln>
+            <a:noFill/>
+          </a:ln>
+        </p:spPr>
+        <p:txBody>
+          <a:bodyPr vert="horz" wrap="square" lIns="91440" tIns="45720" rIns="91440" bIns="45720" numCol="1" anchor="t" anchorCtr="0" compatLnSpc="1">
+            <a:prstTxWarp prst="textNoShape">
+              <a:avLst/>
+            </a:prstTxWarp>
+          </a:bodyPr>
+          <a:lstStyle/>
+          <a:p>
+            <a:endParaRPr lang="en-US"/>
+          </a:p>
+        </p:txBody>
+      </p:sp>
       <p:sp>
         <p:nvSpPr>
           <p:cNvPr id="2" name="Title 1">
@@ -5609,13 +6140,24 @@
             <p:ph type="title"/>
           </p:nvPr>
         </p:nvSpPr>
-        <p:spPr/>
-        <p:txBody>
-          <a:bodyPr/>
-          <a:lstStyle/>
-          <a:p>
-            <a:r>
-              <a:rPr lang="en-US" dirty="0"/>
+        <p:spPr>
+          <a:xfrm>
+            <a:off x="958506" y="800392"/>
+            <a:ext cx="10264697" cy="1212102"/>
+          </a:xfrm>
+        </p:spPr>
+        <p:txBody>
+          <a:bodyPr>
+            <a:normAutofit/>
+          </a:bodyPr>
+          <a:lstStyle/>
+          <a:p>
+            <a:r>
+              <a:rPr lang="en-US" sz="4000">
+                <a:solidFill>
+                  <a:srgbClr val="FFFFFF"/>
+                </a:solidFill>
+              </a:rPr>
               <a:t>Weakness Identifier</a:t>
             </a:r>
           </a:p>
@@ -5637,30 +6179,37 @@
             <p:ph idx="1"/>
           </p:nvPr>
         </p:nvSpPr>
-        <p:spPr/>
-        <p:txBody>
-          <a:bodyPr/>
-          <a:lstStyle/>
-          <a:p>
-            <a:r>
-              <a:rPr lang="en-US" dirty="0"/>
+        <p:spPr>
+          <a:xfrm>
+            <a:off x="1367624" y="2490436"/>
+            <a:ext cx="9708995" cy="3567173"/>
+          </a:xfrm>
+        </p:spPr>
+        <p:txBody>
+          <a:bodyPr anchor="ctr">
+            <a:normAutofit/>
+          </a:bodyPr>
+          <a:lstStyle/>
+          <a:p>
+            <a:r>
+              <a:rPr lang="en-US" sz="2400"/>
               <a:t>Checks the current log with expert’s list of abnormal behaviors.</a:t>
             </a:r>
           </a:p>
           <a:p>
             <a:r>
-              <a:rPr lang="en-US" dirty="0"/>
+              <a:rPr lang="en-US" sz="2400"/>
               <a:t>Checks for the weakness in the log from the 9 categories of weakness listed.</a:t>
             </a:r>
           </a:p>
           <a:p>
             <a:r>
-              <a:rPr lang="en-US" dirty="0"/>
+              <a:rPr lang="en-US" sz="2400"/>
               <a:t>Forwards this potential weakness list to ”Real Weakness identifier”.</a:t>
             </a:r>
           </a:p>
           <a:p>
-            <a:endParaRPr lang="en-US" dirty="0"/>
+            <a:endParaRPr lang="en-US" sz="2400"/>
           </a:p>
         </p:txBody>
       </p:sp>
@@ -5680,6 +6229,14 @@
 <file path=ppt/slides/slide5.xml><?xml version="1.0" encoding="utf-8"?>
 <p:sld xmlns:a="http://schemas.openxmlformats.org/drawingml/2006/main" xmlns:r="http://schemas.openxmlformats.org/officeDocument/2006/relationships" xmlns:p="http://schemas.openxmlformats.org/presentationml/2006/main">
   <p:cSld>
+    <p:bg>
+      <p:bgPr>
+        <a:solidFill>
+          <a:schemeClr val="bg1"/>
+        </a:solidFill>
+        <a:effectLst/>
+      </p:bgPr>
+    </p:bg>
     <p:spTree>
       <p:nvGrpSpPr>
         <p:cNvPr id="1" name=""/>
@@ -5694,6 +6251,528 @@
           <a:chExt cx="0" cy="0"/>
         </a:xfrm>
       </p:grpSpPr>
+      <p:sp useBgFill="1">
+        <p:nvSpPr>
+          <p:cNvPr id="8" name="Rectangle 7">
+            <a:extLst>
+              <a:ext uri="{FF2B5EF4-FFF2-40B4-BE49-F238E27FC236}">
+                <a16:creationId xmlns:a16="http://schemas.microsoft.com/office/drawing/2014/main" id="{827B839B-9ADE-406B-8590-F1CAEDED45A1}"/>
+              </a:ext>
+              <a:ext uri="{C183D7F6-B498-43B3-948B-1728B52AA6E4}">
+                <adec:decorative xmlns:adec="http://schemas.microsoft.com/office/drawing/2017/decorative" val="1"/>
+              </a:ext>
+            </a:extLst>
+          </p:cNvPr>
+          <p:cNvSpPr>
+            <a:spLocks noGrp="1" noRot="1" noChangeAspect="1" noMove="1" noResize="1" noEditPoints="1" noAdjustHandles="1" noChangeArrowheads="1" noChangeShapeType="1" noTextEdit="1"/>
+          </p:cNvSpPr>
+          <p:nvPr>
+            <p:extLst>
+              <p:ext uri="{386F3935-93C4-4BCD-93E2-E3B085C9AB24}">
+                <p16:designElem xmlns:p16="http://schemas.microsoft.com/office/powerpoint/2015/main" val="1"/>
+              </p:ext>
+            </p:extLst>
+          </p:nvPr>
+        </p:nvSpPr>
+        <p:spPr>
+          <a:xfrm>
+            <a:off x="0" y="0"/>
+            <a:ext cx="12188952" cy="6858000"/>
+          </a:xfrm>
+          <a:prstGeom prst="rect">
+            <a:avLst/>
+          </a:prstGeom>
+          <a:ln>
+            <a:noFill/>
+          </a:ln>
+        </p:spPr>
+        <p:style>
+          <a:lnRef idx="2">
+            <a:schemeClr val="accent1">
+              <a:shade val="50000"/>
+            </a:schemeClr>
+          </a:lnRef>
+          <a:fillRef idx="1">
+            <a:schemeClr val="accent1"/>
+          </a:fillRef>
+          <a:effectRef idx="0">
+            <a:schemeClr val="accent1"/>
+          </a:effectRef>
+          <a:fontRef idx="minor">
+            <a:schemeClr val="lt1"/>
+          </a:fontRef>
+        </p:style>
+        <p:txBody>
+          <a:bodyPr rtlCol="0" anchor="ctr"/>
+          <a:lstStyle/>
+          <a:p>
+            <a:pPr algn="ctr"/>
+            <a:endParaRPr lang="en-US"/>
+          </a:p>
+        </p:txBody>
+      </p:sp>
+      <p:sp>
+        <p:nvSpPr>
+          <p:cNvPr id="10" name="Freeform 45">
+            <a:extLst>
+              <a:ext uri="{FF2B5EF4-FFF2-40B4-BE49-F238E27FC236}">
+                <a16:creationId xmlns:a16="http://schemas.microsoft.com/office/drawing/2014/main" id="{CFE45BF0-46DB-408C-B5F7-7B11716805D4}"/>
+              </a:ext>
+              <a:ext uri="{C183D7F6-B498-43B3-948B-1728B52AA6E4}">
+                <adec:decorative xmlns:adec="http://schemas.microsoft.com/office/drawing/2017/decorative" val="1"/>
+              </a:ext>
+            </a:extLst>
+          </p:cNvPr>
+          <p:cNvSpPr>
+            <a:spLocks noGrp="1" noRot="1" noChangeAspect="1" noMove="1" noResize="1" noEditPoints="1" noAdjustHandles="1" noChangeArrowheads="1" noChangeShapeType="1" noTextEdit="1"/>
+          </p:cNvSpPr>
+          <p:nvPr>
+            <p:extLst>
+              <p:ext uri="{386F3935-93C4-4BCD-93E2-E3B085C9AB24}">
+                <p16:designElem xmlns:p16="http://schemas.microsoft.com/office/powerpoint/2015/main" val="1"/>
+              </p:ext>
+            </p:extLst>
+          </p:nvPr>
+        </p:nvSpPr>
+        <p:spPr bwMode="auto">
+          <a:xfrm>
+            <a:off x="409710" y="1022350"/>
+            <a:ext cx="709612" cy="2095501"/>
+          </a:xfrm>
+          <a:custGeom>
+            <a:avLst/>
+            <a:gdLst>
+              <a:gd name="T0" fmla="*/ 447 w 447"/>
+              <a:gd name="T1" fmla="*/ 1363 h 1363"/>
+              <a:gd name="T2" fmla="*/ 0 w 447"/>
+              <a:gd name="T3" fmla="*/ 987 h 1363"/>
+              <a:gd name="T4" fmla="*/ 0 w 447"/>
+              <a:gd name="T5" fmla="*/ 0 h 1363"/>
+              <a:gd name="T6" fmla="*/ 447 w 447"/>
+              <a:gd name="T7" fmla="*/ 376 h 1363"/>
+              <a:gd name="T8" fmla="*/ 447 w 447"/>
+              <a:gd name="T9" fmla="*/ 1363 h 1363"/>
+            </a:gdLst>
+            <a:ahLst/>
+            <a:cxnLst>
+              <a:cxn ang="0">
+                <a:pos x="T0" y="T1"/>
+              </a:cxn>
+              <a:cxn ang="0">
+                <a:pos x="T2" y="T3"/>
+              </a:cxn>
+              <a:cxn ang="0">
+                <a:pos x="T4" y="T5"/>
+              </a:cxn>
+              <a:cxn ang="0">
+                <a:pos x="T6" y="T7"/>
+              </a:cxn>
+              <a:cxn ang="0">
+                <a:pos x="T8" y="T9"/>
+              </a:cxn>
+            </a:cxnLst>
+            <a:rect l="0" t="0" r="r" b="b"/>
+            <a:pathLst>
+              <a:path w="447" h="1363">
+                <a:moveTo>
+                  <a:pt x="447" y="1363"/>
+                </a:moveTo>
+                <a:lnTo>
+                  <a:pt x="0" y="987"/>
+                </a:lnTo>
+                <a:lnTo>
+                  <a:pt x="0" y="0"/>
+                </a:lnTo>
+                <a:lnTo>
+                  <a:pt x="447" y="376"/>
+                </a:lnTo>
+                <a:lnTo>
+                  <a:pt x="447" y="1363"/>
+                </a:lnTo>
+                <a:close/>
+              </a:path>
+            </a:pathLst>
+          </a:custGeom>
+          <a:solidFill>
+            <a:schemeClr val="accent1">
+              <a:lumMod val="50000"/>
+            </a:schemeClr>
+          </a:solidFill>
+          <a:ln>
+            <a:noFill/>
+          </a:ln>
+        </p:spPr>
+        <p:txBody>
+          <a:bodyPr vert="horz" wrap="square" lIns="91440" tIns="45720" rIns="91440" bIns="45720" numCol="1" anchor="t" anchorCtr="0" compatLnSpc="1">
+            <a:prstTxWarp prst="textNoShape">
+              <a:avLst/>
+            </a:prstTxWarp>
+          </a:bodyPr>
+          <a:lstStyle/>
+          <a:p>
+            <a:endParaRPr lang="en-US"/>
+          </a:p>
+        </p:txBody>
+      </p:sp>
+      <p:sp>
+        <p:nvSpPr>
+          <p:cNvPr id="12" name="Freeform 46">
+            <a:extLst>
+              <a:ext uri="{FF2B5EF4-FFF2-40B4-BE49-F238E27FC236}">
+                <a16:creationId xmlns:a16="http://schemas.microsoft.com/office/drawing/2014/main" id="{2AEBC8F2-97B1-41B4-93F1-2D289E197FBA}"/>
+              </a:ext>
+              <a:ext uri="{C183D7F6-B498-43B3-948B-1728B52AA6E4}">
+                <adec:decorative xmlns:adec="http://schemas.microsoft.com/office/drawing/2017/decorative" val="1"/>
+              </a:ext>
+            </a:extLst>
+          </p:cNvPr>
+          <p:cNvSpPr>
+            <a:spLocks noGrp="1" noRot="1" noChangeAspect="1" noMove="1" noResize="1" noEditPoints="1" noAdjustHandles="1" noChangeArrowheads="1" noChangeShapeType="1" noTextEdit="1"/>
+          </p:cNvSpPr>
+          <p:nvPr>
+            <p:extLst>
+              <p:ext uri="{386F3935-93C4-4BCD-93E2-E3B085C9AB24}">
+                <p16:designElem xmlns:p16="http://schemas.microsoft.com/office/powerpoint/2015/main" val="1"/>
+              </p:ext>
+            </p:extLst>
+          </p:nvPr>
+        </p:nvSpPr>
+        <p:spPr bwMode="auto">
+          <a:xfrm>
+            <a:off x="409710" y="837744"/>
+            <a:ext cx="403225" cy="1705431"/>
+          </a:xfrm>
+          <a:custGeom>
+            <a:avLst/>
+            <a:gdLst>
+              <a:gd name="T0" fmla="*/ 254 w 254"/>
+              <a:gd name="T1" fmla="*/ 987 h 1109"/>
+              <a:gd name="T2" fmla="*/ 0 w 254"/>
+              <a:gd name="T3" fmla="*/ 1109 h 1109"/>
+              <a:gd name="T4" fmla="*/ 0 w 254"/>
+              <a:gd name="T5" fmla="*/ 119 h 1109"/>
+              <a:gd name="T6" fmla="*/ 254 w 254"/>
+              <a:gd name="T7" fmla="*/ 0 h 1109"/>
+              <a:gd name="T8" fmla="*/ 254 w 254"/>
+              <a:gd name="T9" fmla="*/ 987 h 1109"/>
+            </a:gdLst>
+            <a:ahLst/>
+            <a:cxnLst>
+              <a:cxn ang="0">
+                <a:pos x="T0" y="T1"/>
+              </a:cxn>
+              <a:cxn ang="0">
+                <a:pos x="T2" y="T3"/>
+              </a:cxn>
+              <a:cxn ang="0">
+                <a:pos x="T4" y="T5"/>
+              </a:cxn>
+              <a:cxn ang="0">
+                <a:pos x="T6" y="T7"/>
+              </a:cxn>
+              <a:cxn ang="0">
+                <a:pos x="T8" y="T9"/>
+              </a:cxn>
+            </a:cxnLst>
+            <a:rect l="0" t="0" r="r" b="b"/>
+            <a:pathLst>
+              <a:path w="254" h="1109">
+                <a:moveTo>
+                  <a:pt x="254" y="987"/>
+                </a:moveTo>
+                <a:lnTo>
+                  <a:pt x="0" y="1109"/>
+                </a:lnTo>
+                <a:lnTo>
+                  <a:pt x="0" y="119"/>
+                </a:lnTo>
+                <a:lnTo>
+                  <a:pt x="254" y="0"/>
+                </a:lnTo>
+                <a:lnTo>
+                  <a:pt x="254" y="987"/>
+                </a:lnTo>
+                <a:close/>
+              </a:path>
+            </a:pathLst>
+          </a:custGeom>
+          <a:solidFill>
+            <a:schemeClr val="accent1">
+              <a:lumMod val="75000"/>
+            </a:schemeClr>
+          </a:solidFill>
+          <a:ln>
+            <a:noFill/>
+          </a:ln>
+        </p:spPr>
+        <p:txBody>
+          <a:bodyPr vert="horz" wrap="square" lIns="91440" tIns="45720" rIns="91440" bIns="45720" numCol="1" anchor="t" anchorCtr="0" compatLnSpc="1">
+            <a:prstTxWarp prst="textNoShape">
+              <a:avLst/>
+            </a:prstTxWarp>
+          </a:bodyPr>
+          <a:lstStyle/>
+          <a:p>
+            <a:endParaRPr lang="en-US"/>
+          </a:p>
+        </p:txBody>
+      </p:sp>
+      <p:sp>
+        <p:nvSpPr>
+          <p:cNvPr id="14" name="Freeform 47">
+            <a:extLst>
+              <a:ext uri="{FF2B5EF4-FFF2-40B4-BE49-F238E27FC236}">
+                <a16:creationId xmlns:a16="http://schemas.microsoft.com/office/drawing/2014/main" id="{472E3A19-F5D5-48FC-BB9C-48C2F68F598B}"/>
+              </a:ext>
+              <a:ext uri="{C183D7F6-B498-43B3-948B-1728B52AA6E4}">
+                <adec:decorative xmlns:adec="http://schemas.microsoft.com/office/drawing/2017/decorative" val="1"/>
+              </a:ext>
+            </a:extLst>
+          </p:cNvPr>
+          <p:cNvSpPr>
+            <a:spLocks noGrp="1" noRot="1" noChangeAspect="1" noMove="1" noResize="1" noEditPoints="1" noAdjustHandles="1" noChangeArrowheads="1" noChangeShapeType="1" noTextEdit="1"/>
+          </p:cNvSpPr>
+          <p:nvPr>
+            <p:extLst>
+              <p:ext uri="{386F3935-93C4-4BCD-93E2-E3B085C9AB24}">
+                <p16:designElem xmlns:p16="http://schemas.microsoft.com/office/powerpoint/2015/main" val="1"/>
+              </p:ext>
+            </p:extLst>
+          </p:nvPr>
+        </p:nvSpPr>
+        <p:spPr bwMode="auto">
+          <a:xfrm>
+            <a:off x="644660" y="640894"/>
+            <a:ext cx="168275" cy="1713195"/>
+          </a:xfrm>
+          <a:custGeom>
+            <a:avLst/>
+            <a:gdLst>
+              <a:gd name="T0" fmla="*/ 106 w 106"/>
+              <a:gd name="T1" fmla="*/ 1114 h 1114"/>
+              <a:gd name="T2" fmla="*/ 0 w 106"/>
+              <a:gd name="T3" fmla="*/ 1005 h 1114"/>
+              <a:gd name="T4" fmla="*/ 0 w 106"/>
+              <a:gd name="T5" fmla="*/ 0 h 1114"/>
+              <a:gd name="T6" fmla="*/ 106 w 106"/>
+              <a:gd name="T7" fmla="*/ 110 h 1114"/>
+              <a:gd name="T8" fmla="*/ 106 w 106"/>
+              <a:gd name="T9" fmla="*/ 1114 h 1114"/>
+            </a:gdLst>
+            <a:ahLst/>
+            <a:cxnLst>
+              <a:cxn ang="0">
+                <a:pos x="T0" y="T1"/>
+              </a:cxn>
+              <a:cxn ang="0">
+                <a:pos x="T2" y="T3"/>
+              </a:cxn>
+              <a:cxn ang="0">
+                <a:pos x="T4" y="T5"/>
+              </a:cxn>
+              <a:cxn ang="0">
+                <a:pos x="T6" y="T7"/>
+              </a:cxn>
+              <a:cxn ang="0">
+                <a:pos x="T8" y="T9"/>
+              </a:cxn>
+            </a:cxnLst>
+            <a:rect l="0" t="0" r="r" b="b"/>
+            <a:pathLst>
+              <a:path w="106" h="1114">
+                <a:moveTo>
+                  <a:pt x="106" y="1114"/>
+                </a:moveTo>
+                <a:lnTo>
+                  <a:pt x="0" y="1005"/>
+                </a:lnTo>
+                <a:lnTo>
+                  <a:pt x="0" y="0"/>
+                </a:lnTo>
+                <a:lnTo>
+                  <a:pt x="106" y="110"/>
+                </a:lnTo>
+                <a:lnTo>
+                  <a:pt x="106" y="1114"/>
+                </a:lnTo>
+                <a:close/>
+              </a:path>
+            </a:pathLst>
+          </a:custGeom>
+          <a:solidFill>
+            <a:schemeClr val="accent1">
+              <a:lumMod val="50000"/>
+            </a:schemeClr>
+          </a:solidFill>
+          <a:ln>
+            <a:noFill/>
+          </a:ln>
+        </p:spPr>
+        <p:txBody>
+          <a:bodyPr vert="horz" wrap="square" lIns="91440" tIns="45720" rIns="91440" bIns="45720" numCol="1" anchor="t" anchorCtr="0" compatLnSpc="1">
+            <a:prstTxWarp prst="textNoShape">
+              <a:avLst/>
+            </a:prstTxWarp>
+          </a:bodyPr>
+          <a:lstStyle/>
+          <a:p>
+            <a:endParaRPr lang="en-US"/>
+          </a:p>
+        </p:txBody>
+      </p:sp>
+      <p:sp>
+        <p:nvSpPr>
+          <p:cNvPr id="16" name="Freeform 44">
+            <a:extLst>
+              <a:ext uri="{FF2B5EF4-FFF2-40B4-BE49-F238E27FC236}">
+                <a16:creationId xmlns:a16="http://schemas.microsoft.com/office/drawing/2014/main" id="{7A62E32F-BB65-43A8-8EB5-92346890E549}"/>
+              </a:ext>
+              <a:ext uri="{C183D7F6-B498-43B3-948B-1728B52AA6E4}">
+                <adec:decorative xmlns:adec="http://schemas.microsoft.com/office/drawing/2017/decorative" val="1"/>
+              </a:ext>
+            </a:extLst>
+          </p:cNvPr>
+          <p:cNvSpPr>
+            <a:spLocks noGrp="1" noRot="1" noChangeAspect="1" noMove="1" noResize="1" noEditPoints="1" noAdjustHandles="1" noChangeArrowheads="1" noChangeShapeType="1" noTextEdit="1"/>
+          </p:cNvSpPr>
+          <p:nvPr>
+            <p:extLst>
+              <p:ext uri="{386F3935-93C4-4BCD-93E2-E3B085C9AB24}">
+                <p16:designElem xmlns:p16="http://schemas.microsoft.com/office/powerpoint/2015/main" val="1"/>
+              </p:ext>
+            </p:extLst>
+          </p:nvPr>
+        </p:nvSpPr>
+        <p:spPr bwMode="auto">
+          <a:xfrm>
+            <a:off x="11223203" y="635716"/>
+            <a:ext cx="328612" cy="1742360"/>
+          </a:xfrm>
+          <a:custGeom>
+            <a:avLst/>
+            <a:gdLst>
+              <a:gd name="T0" fmla="*/ 207 w 207"/>
+              <a:gd name="T1" fmla="*/ 987 h 1114"/>
+              <a:gd name="T2" fmla="*/ 0 w 207"/>
+              <a:gd name="T3" fmla="*/ 1114 h 1114"/>
+              <a:gd name="T4" fmla="*/ 0 w 207"/>
+              <a:gd name="T5" fmla="*/ 127 h 1114"/>
+              <a:gd name="T6" fmla="*/ 207 w 207"/>
+              <a:gd name="T7" fmla="*/ 0 h 1114"/>
+              <a:gd name="T8" fmla="*/ 207 w 207"/>
+              <a:gd name="T9" fmla="*/ 987 h 1114"/>
+            </a:gdLst>
+            <a:ahLst/>
+            <a:cxnLst>
+              <a:cxn ang="0">
+                <a:pos x="T0" y="T1"/>
+              </a:cxn>
+              <a:cxn ang="0">
+                <a:pos x="T2" y="T3"/>
+              </a:cxn>
+              <a:cxn ang="0">
+                <a:pos x="T4" y="T5"/>
+              </a:cxn>
+              <a:cxn ang="0">
+                <a:pos x="T6" y="T7"/>
+              </a:cxn>
+              <a:cxn ang="0">
+                <a:pos x="T8" y="T9"/>
+              </a:cxn>
+            </a:cxnLst>
+            <a:rect l="0" t="0" r="r" b="b"/>
+            <a:pathLst>
+              <a:path w="207" h="1114">
+                <a:moveTo>
+                  <a:pt x="207" y="987"/>
+                </a:moveTo>
+                <a:lnTo>
+                  <a:pt x="0" y="1114"/>
+                </a:lnTo>
+                <a:lnTo>
+                  <a:pt x="0" y="127"/>
+                </a:lnTo>
+                <a:lnTo>
+                  <a:pt x="207" y="0"/>
+                </a:lnTo>
+                <a:lnTo>
+                  <a:pt x="207" y="987"/>
+                </a:lnTo>
+                <a:close/>
+              </a:path>
+            </a:pathLst>
+          </a:custGeom>
+          <a:solidFill>
+            <a:schemeClr val="accent1">
+              <a:lumMod val="50000"/>
+            </a:schemeClr>
+          </a:solidFill>
+          <a:ln>
+            <a:noFill/>
+          </a:ln>
+        </p:spPr>
+        <p:txBody>
+          <a:bodyPr vert="horz" wrap="square" lIns="91440" tIns="45720" rIns="91440" bIns="45720" numCol="1" anchor="t" anchorCtr="0" compatLnSpc="1">
+            <a:prstTxWarp prst="textNoShape">
+              <a:avLst/>
+            </a:prstTxWarp>
+          </a:bodyPr>
+          <a:lstStyle/>
+          <a:p>
+            <a:endParaRPr lang="en-US"/>
+          </a:p>
+        </p:txBody>
+      </p:sp>
+      <p:sp>
+        <p:nvSpPr>
+          <p:cNvPr id="18" name="Rectangle 17">
+            <a:extLst>
+              <a:ext uri="{FF2B5EF4-FFF2-40B4-BE49-F238E27FC236}">
+                <a16:creationId xmlns:a16="http://schemas.microsoft.com/office/drawing/2014/main" id="{14E91B64-9FCC-451E-AFB4-A827D6329367}"/>
+              </a:ext>
+              <a:ext uri="{C183D7F6-B498-43B3-948B-1728B52AA6E4}">
+                <adec:decorative xmlns:adec="http://schemas.microsoft.com/office/drawing/2017/decorative" val="1"/>
+              </a:ext>
+            </a:extLst>
+          </p:cNvPr>
+          <p:cNvSpPr>
+            <a:spLocks noGrp="1" noRot="1" noChangeAspect="1" noMove="1" noResize="1" noEditPoints="1" noAdjustHandles="1" noChangeArrowheads="1" noChangeShapeType="1" noTextEdit="1"/>
+          </p:cNvSpPr>
+          <p:nvPr>
+            <p:extLst>
+              <p:ext uri="{386F3935-93C4-4BCD-93E2-E3B085C9AB24}">
+                <p16:designElem xmlns:p16="http://schemas.microsoft.com/office/powerpoint/2015/main" val="1"/>
+              </p:ext>
+            </p:extLst>
+          </p:nvPr>
+        </p:nvSpPr>
+        <p:spPr bwMode="auto">
+          <a:xfrm>
+            <a:off x="644055" y="635715"/>
+            <a:ext cx="10907863" cy="1541457"/>
+          </a:xfrm>
+          <a:prstGeom prst="rect">
+            <a:avLst/>
+          </a:prstGeom>
+          <a:solidFill>
+            <a:schemeClr val="accent1"/>
+          </a:solidFill>
+          <a:ln>
+            <a:noFill/>
+          </a:ln>
+        </p:spPr>
+        <p:txBody>
+          <a:bodyPr vert="horz" wrap="square" lIns="91440" tIns="45720" rIns="91440" bIns="45720" numCol="1" anchor="t" anchorCtr="0" compatLnSpc="1">
+            <a:prstTxWarp prst="textNoShape">
+              <a:avLst/>
+            </a:prstTxWarp>
+          </a:bodyPr>
+          <a:lstStyle/>
+          <a:p>
+            <a:endParaRPr lang="en-US"/>
+          </a:p>
+        </p:txBody>
+      </p:sp>
       <p:sp>
         <p:nvSpPr>
           <p:cNvPr id="2" name="Title 1">
@@ -5710,13 +6789,24 @@
             <p:ph type="title"/>
           </p:nvPr>
         </p:nvSpPr>
-        <p:spPr/>
-        <p:txBody>
-          <a:bodyPr/>
-          <a:lstStyle/>
-          <a:p>
-            <a:r>
-              <a:rPr lang="en-US" dirty="0"/>
+        <p:spPr>
+          <a:xfrm>
+            <a:off x="958506" y="800392"/>
+            <a:ext cx="10264697" cy="1212102"/>
+          </a:xfrm>
+        </p:spPr>
+        <p:txBody>
+          <a:bodyPr>
+            <a:normAutofit/>
+          </a:bodyPr>
+          <a:lstStyle/>
+          <a:p>
+            <a:r>
+              <a:rPr lang="en-US" sz="4000">
+                <a:solidFill>
+                  <a:srgbClr val="FFFFFF"/>
+                </a:solidFill>
+              </a:rPr>
               <a:t>Real Weakness identifier</a:t>
             </a:r>
           </a:p>
@@ -5738,27 +6828,34 @@
             <p:ph idx="1"/>
           </p:nvPr>
         </p:nvSpPr>
-        <p:spPr/>
-        <p:txBody>
-          <a:bodyPr/>
-          <a:lstStyle/>
-          <a:p>
-            <a:r>
-              <a:rPr lang="en-US" dirty="0"/>
-              <a:t>Uses the history of abnormal behaviors from “Previous list of weakness” to compare and filter the potential weakness list to get real weakness list.</a:t>
-            </a:r>
-          </a:p>
-          <a:p>
-            <a:r>
-              <a:rPr lang="en-US" dirty="0"/>
+        <p:spPr>
+          <a:xfrm>
+            <a:off x="1367624" y="2490436"/>
+            <a:ext cx="9708995" cy="3567173"/>
+          </a:xfrm>
+        </p:spPr>
+        <p:txBody>
+          <a:bodyPr anchor="ctr">
+            <a:normAutofit/>
+          </a:bodyPr>
+          <a:lstStyle/>
+          <a:p>
+            <a:r>
+              <a:rPr lang="en-US" sz="2400"/>
+              <a:t>Uses the history of abnormal behaviors from “Previous list of weakness” to compare and filter the potential weakness list to get real weakness list. Possibly general process time for a particular activity.</a:t>
+            </a:r>
+          </a:p>
+          <a:p>
+            <a:r>
+              <a:rPr lang="en-US" sz="2400"/>
               <a:t>Forwards the real weakness list for representation on model and also saves them in “Previous list of weakness” for future use. </a:t>
             </a:r>
           </a:p>
           <a:p>
-            <a:endParaRPr lang="en-US" dirty="0"/>
-          </a:p>
-          <a:p>
-            <a:endParaRPr lang="en-US" dirty="0"/>
+            <a:endParaRPr lang="en-US" sz="2400"/>
+          </a:p>
+          <a:p>
+            <a:endParaRPr lang="en-US" sz="2400"/>
           </a:p>
         </p:txBody>
       </p:sp>
@@ -5776,6 +6873,89 @@
 </file>
 
 <file path=ppt/slides/slide6.xml><?xml version="1.0" encoding="utf-8"?>
+<p:sld xmlns:a="http://schemas.openxmlformats.org/drawingml/2006/main" xmlns:r="http://schemas.openxmlformats.org/officeDocument/2006/relationships" xmlns:p="http://schemas.openxmlformats.org/presentationml/2006/main">
+  <p:cSld>
+    <p:spTree>
+      <p:nvGrpSpPr>
+        <p:cNvPr id="1" name=""/>
+        <p:cNvGrpSpPr/>
+        <p:nvPr/>
+      </p:nvGrpSpPr>
+      <p:grpSpPr>
+        <a:xfrm>
+          <a:off x="0" y="0"/>
+          <a:ext cx="0" cy="0"/>
+          <a:chOff x="0" y="0"/>
+          <a:chExt cx="0" cy="0"/>
+        </a:xfrm>
+      </p:grpSpPr>
+      <p:sp>
+        <p:nvSpPr>
+          <p:cNvPr id="2" name="Title 1">
+            <a:extLst>
+              <a:ext uri="{FF2B5EF4-FFF2-40B4-BE49-F238E27FC236}">
+                <a16:creationId xmlns:a16="http://schemas.microsoft.com/office/drawing/2014/main" id="{055C6DD1-6DFE-034E-B98E-FCBD11E763EB}"/>
+              </a:ext>
+            </a:extLst>
+          </p:cNvPr>
+          <p:cNvSpPr>
+            <a:spLocks noGrp="1"/>
+          </p:cNvSpPr>
+          <p:nvPr>
+            <p:ph type="title"/>
+          </p:nvPr>
+        </p:nvSpPr>
+        <p:spPr/>
+        <p:txBody>
+          <a:bodyPr/>
+          <a:lstStyle/>
+          <a:p>
+            <a:r>
+              <a:rPr lang="en-US" dirty="0"/>
+              <a:t>Suggestions:</a:t>
+            </a:r>
+          </a:p>
+        </p:txBody>
+      </p:sp>
+      <p:sp>
+        <p:nvSpPr>
+          <p:cNvPr id="3" name="Content Placeholder 2">
+            <a:extLst>
+              <a:ext uri="{FF2B5EF4-FFF2-40B4-BE49-F238E27FC236}">
+                <a16:creationId xmlns:a16="http://schemas.microsoft.com/office/drawing/2014/main" id="{59A52EB4-CB16-4F4C-B757-A574A9538EBC}"/>
+              </a:ext>
+            </a:extLst>
+          </p:cNvPr>
+          <p:cNvSpPr>
+            <a:spLocks noGrp="1"/>
+          </p:cNvSpPr>
+          <p:nvPr>
+            <p:ph idx="1"/>
+          </p:nvPr>
+        </p:nvSpPr>
+        <p:spPr/>
+        <p:txBody>
+          <a:bodyPr/>
+          <a:lstStyle/>
+          <a:p>
+            <a:endParaRPr lang="en-US" dirty="0"/>
+          </a:p>
+        </p:txBody>
+      </p:sp>
+    </p:spTree>
+    <p:extLst>
+      <p:ext uri="{BB962C8B-B14F-4D97-AF65-F5344CB8AC3E}">
+        <p14:creationId xmlns:p14="http://schemas.microsoft.com/office/powerpoint/2010/main" val="3390000662"/>
+      </p:ext>
+    </p:extLst>
+  </p:cSld>
+  <p:clrMapOvr>
+    <a:masterClrMapping/>
+  </p:clrMapOvr>
+</p:sld>
+</file>
+
+<file path=ppt/slides/slide7.xml><?xml version="1.0" encoding="utf-8"?>
 <p:sld xmlns:a="http://schemas.openxmlformats.org/drawingml/2006/main" xmlns:r="http://schemas.openxmlformats.org/officeDocument/2006/relationships" xmlns:p="http://schemas.openxmlformats.org/presentationml/2006/main">
   <p:cSld>
     <p:bg>

</xml_diff>